<commit_message>
clean up of redunant code
</commit_message>
<xml_diff>
--- a/powerpoint/Inverse problems project.pptx
+++ b/powerpoint/Inverse problems project.pptx
@@ -12,8 +12,7 @@
     <p:sldId id="358" r:id="rId6"/>
     <p:sldId id="359" r:id="rId7"/>
     <p:sldId id="361" r:id="rId8"/>
-    <p:sldId id="360" r:id="rId9"/>
-    <p:sldId id="352" r:id="rId10"/>
+    <p:sldId id="352" r:id="rId9"/>
   </p:sldIdLst>
   <p:sldSz cx="12192000" cy="6858000"/>
   <p:notesSz cx="6858000" cy="9144000"/>
@@ -112,6 +111,11 @@
       </a:defRPr>
     </a:lvl9pPr>
   </p:defaultTextStyle>
+  <p:extLst>
+    <p:ext uri="{EFAFB233-063F-42B5-8137-9DF3F51BA10A}">
+      <p15:sldGuideLst xmlns:p15="http://schemas.microsoft.com/office/powerpoint/2012/main"/>
+    </p:ext>
+  </p:extLst>
 </p:presentation>
 </file>
 
@@ -264,7 +268,7 @@
           <a:p>
             <a:fld id="{CFC9BEC7-E5F4-4E88-9485-B63868A6B472}" type="datetimeFigureOut">
               <a:rPr lang="en-GB" smtClean="0"/>
-              <a:t>14/05/2025</a:t>
+              <a:t>16/05/2025</a:t>
             </a:fld>
             <a:endParaRPr lang="en-GB"/>
           </a:p>
@@ -464,7 +468,7 @@
           <a:p>
             <a:fld id="{CFC9BEC7-E5F4-4E88-9485-B63868A6B472}" type="datetimeFigureOut">
               <a:rPr lang="en-GB" smtClean="0"/>
-              <a:t>14/05/2025</a:t>
+              <a:t>16/05/2025</a:t>
             </a:fld>
             <a:endParaRPr lang="en-GB"/>
           </a:p>
@@ -674,7 +678,7 @@
           <a:p>
             <a:fld id="{CFC9BEC7-E5F4-4E88-9485-B63868A6B472}" type="datetimeFigureOut">
               <a:rPr lang="en-GB" smtClean="0"/>
-              <a:t>14/05/2025</a:t>
+              <a:t>16/05/2025</a:t>
             </a:fld>
             <a:endParaRPr lang="en-GB"/>
           </a:p>
@@ -811,7 +815,7 @@
           <a:p>
             <a:fld id="{7921EB27-6C1B-D840-956D-529C87AC8247}" type="datetime1">
               <a:rPr lang="nl-NL" smtClean="0"/>
-              <a:t>14-5-2025</a:t>
+              <a:t>16-5-2025</a:t>
             </a:fld>
             <a:endParaRPr lang="en-GB"/>
           </a:p>
@@ -1283,7 +1287,7 @@
           <a:p>
             <a:fld id="{CFC9BEC7-E5F4-4E88-9485-B63868A6B472}" type="datetimeFigureOut">
               <a:rPr lang="en-GB" smtClean="0"/>
-              <a:t>14/05/2025</a:t>
+              <a:t>16/05/2025</a:t>
             </a:fld>
             <a:endParaRPr lang="en-GB"/>
           </a:p>
@@ -1559,7 +1563,7 @@
           <a:p>
             <a:fld id="{CFC9BEC7-E5F4-4E88-9485-B63868A6B472}" type="datetimeFigureOut">
               <a:rPr lang="en-GB" smtClean="0"/>
-              <a:t>14/05/2025</a:t>
+              <a:t>16/05/2025</a:t>
             </a:fld>
             <a:endParaRPr lang="en-GB"/>
           </a:p>
@@ -1827,7 +1831,7 @@
           <a:p>
             <a:fld id="{CFC9BEC7-E5F4-4E88-9485-B63868A6B472}" type="datetimeFigureOut">
               <a:rPr lang="en-GB" smtClean="0"/>
-              <a:t>14/05/2025</a:t>
+              <a:t>16/05/2025</a:t>
             </a:fld>
             <a:endParaRPr lang="en-GB"/>
           </a:p>
@@ -2242,7 +2246,7 @@
           <a:p>
             <a:fld id="{CFC9BEC7-E5F4-4E88-9485-B63868A6B472}" type="datetimeFigureOut">
               <a:rPr lang="en-GB" smtClean="0"/>
-              <a:t>14/05/2025</a:t>
+              <a:t>16/05/2025</a:t>
             </a:fld>
             <a:endParaRPr lang="en-GB"/>
           </a:p>
@@ -2384,7 +2388,7 @@
           <a:p>
             <a:fld id="{CFC9BEC7-E5F4-4E88-9485-B63868A6B472}" type="datetimeFigureOut">
               <a:rPr lang="en-GB" smtClean="0"/>
-              <a:t>14/05/2025</a:t>
+              <a:t>16/05/2025</a:t>
             </a:fld>
             <a:endParaRPr lang="en-GB"/>
           </a:p>
@@ -2497,7 +2501,7 @@
           <a:p>
             <a:fld id="{CFC9BEC7-E5F4-4E88-9485-B63868A6B472}" type="datetimeFigureOut">
               <a:rPr lang="en-GB" smtClean="0"/>
-              <a:t>14/05/2025</a:t>
+              <a:t>16/05/2025</a:t>
             </a:fld>
             <a:endParaRPr lang="en-GB"/>
           </a:p>
@@ -2810,7 +2814,7 @@
           <a:p>
             <a:fld id="{CFC9BEC7-E5F4-4E88-9485-B63868A6B472}" type="datetimeFigureOut">
               <a:rPr lang="en-GB" smtClean="0"/>
-              <a:t>14/05/2025</a:t>
+              <a:t>16/05/2025</a:t>
             </a:fld>
             <a:endParaRPr lang="en-GB"/>
           </a:p>
@@ -3099,7 +3103,7 @@
           <a:p>
             <a:fld id="{CFC9BEC7-E5F4-4E88-9485-B63868A6B472}" type="datetimeFigureOut">
               <a:rPr lang="en-GB" smtClean="0"/>
-              <a:t>14/05/2025</a:t>
+              <a:t>16/05/2025</a:t>
             </a:fld>
             <a:endParaRPr lang="en-GB"/>
           </a:p>
@@ -3342,7 +3346,7 @@
           <a:p>
             <a:fld id="{CFC9BEC7-E5F4-4E88-9485-B63868A6B472}" type="datetimeFigureOut">
               <a:rPr lang="en-GB" smtClean="0"/>
-              <a:t>14/05/2025</a:t>
+              <a:t>16/05/2025</a:t>
             </a:fld>
             <a:endParaRPr lang="en-GB"/>
           </a:p>
@@ -3789,7 +3793,7 @@
           <a:p>
             <a:fld id="{7921EB27-6C1B-D840-956D-529C87AC8247}" type="datetime1">
               <a:rPr lang="en-GB" noProof="0" smtClean="0"/>
-              <a:t>14/05/2025</a:t>
+              <a:t>16/05/2025</a:t>
             </a:fld>
             <a:endParaRPr lang="en-GB" noProof="0" dirty="0"/>
           </a:p>
@@ -3869,8 +3873,8 @@
         </p:nvSpPr>
         <p:spPr>
           <a:xfrm>
-            <a:off x="480408" y="2244348"/>
-            <a:ext cx="11196267" cy="1200329"/>
+            <a:off x="639461" y="2407652"/>
+            <a:ext cx="11196267" cy="1477328"/>
           </a:xfrm>
           <a:prstGeom prst="rect">
             <a:avLst/>
@@ -3891,17 +3895,28 @@
             </a:r>
           </a:p>
           <a:p>
+            <a:endParaRPr lang="en-GB" dirty="0">
+              <a:latin typeface="+mj-lt"/>
+            </a:endParaRPr>
+          </a:p>
+          <a:p>
+            <a:r>
+              <a:rPr lang="en-GB" dirty="0">
+                <a:latin typeface="+mj-lt"/>
+              </a:rPr>
+              <a:t>Possible metrics for comparison.</a:t>
+            </a:r>
+          </a:p>
+          <a:p>
+            <a:r>
+              <a:rPr lang="en-GB" dirty="0">
+                <a:latin typeface="+mj-lt"/>
+              </a:rPr>
+              <a:t> </a:t>
+            </a:r>
             <a:endParaRPr lang="en-GB" noProof="0" dirty="0">
               <a:latin typeface="+mj-lt"/>
             </a:endParaRPr>
-          </a:p>
-          <a:p>
-            <a:r>
-              <a:rPr lang="en-GB" noProof="0" dirty="0">
-                <a:latin typeface="+mj-lt"/>
-              </a:rPr>
-              <a:t>Placeholder for what we want to discuss.</a:t>
-            </a:r>
           </a:p>
           <a:p>
             <a:endParaRPr lang="en-GB" noProof="0" dirty="0">
@@ -3969,7 +3984,7 @@
           <a:p>
             <a:fld id="{7921EB27-6C1B-D840-956D-529C87AC8247}" type="datetime1">
               <a:rPr lang="en-GB" noProof="0" smtClean="0"/>
-              <a:t>14-5-2025</a:t>
+              <a:t>16/05/2025</a:t>
             </a:fld>
             <a:endParaRPr lang="en-GB" noProof="0" dirty="0"/>
           </a:p>
@@ -4374,7 +4389,13 @@
                 <a:effectLst/>
                 <a:latin typeface="Arial" panose="020B0604020202020204" pitchFamily="34" charset="0"/>
               </a:rPr>
-              <a:t>Investigate cross-hospital image compatibility</a:t>
+              <a:t>Investigate </a:t>
+            </a:r>
+            <a:r>
+              <a:rPr lang="en-GB" b="1" dirty="0">
+                <a:latin typeface="Arial" panose="020B0604020202020204" pitchFamily="34" charset="0"/>
+              </a:rPr>
+              <a:t>harmonisation</a:t>
             </a:r>
             <a:r>
               <a:rPr kumimoji="0" lang="en-GB" sz="1800" b="0" i="0" u="none" strike="noStrike" cap="none" normalizeH="0" baseline="0" noProof="0" dirty="0">
@@ -4485,7 +4506,7 @@
                 <a:effectLst/>
                 <a:latin typeface="Arial" panose="020B0604020202020204" pitchFamily="34" charset="0"/>
               </a:rPr>
-              <a:t>Investigate reversibility and transformation</a:t>
+              <a:t>Investigate transformation</a:t>
             </a:r>
             <a:r>
               <a:rPr kumimoji="0" lang="en-GB" sz="1800" b="0" i="0" u="none" strike="noStrike" cap="none" normalizeH="0" baseline="0" noProof="0" dirty="0">
@@ -4625,7 +4646,7 @@
           <a:p>
             <a:fld id="{7921EB27-6C1B-D840-956D-529C87AC8247}" type="datetime1">
               <a:rPr lang="en-GB" noProof="0" smtClean="0"/>
-              <a:t>14/05/2025</a:t>
+              <a:t>16/05/2025</a:t>
             </a:fld>
             <a:endParaRPr lang="en-GB" noProof="0" dirty="0"/>
           </a:p>
@@ -4706,7 +4727,7 @@
         <p:spPr>
           <a:xfrm>
             <a:off x="497866" y="2217454"/>
-            <a:ext cx="11196267" cy="3970318"/>
+            <a:ext cx="11196267" cy="4247317"/>
           </a:xfrm>
           <a:prstGeom prst="rect">
             <a:avLst/>
@@ -4719,6 +4740,10 @@
           </a:bodyPr>
           <a:lstStyle/>
           <a:p>
+            <a:pPr marL="342900" indent="-342900">
+              <a:buFont typeface="+mj-lt"/>
+              <a:buAutoNum type="arabicPeriod"/>
+            </a:pPr>
             <a:r>
               <a:rPr lang="en-GB" b="1" noProof="0" dirty="0">
                 <a:latin typeface="+mj-lt"/>
@@ -4734,25 +4759,46 @@
             </a:r>
           </a:p>
           <a:p>
+            <a:pPr marL="342900" indent="-342900">
+              <a:buFont typeface="+mj-lt"/>
+              <a:buAutoNum type="arabicPeriod"/>
+            </a:pPr>
             <a:endParaRPr lang="en-GB" noProof="0" dirty="0">
               <a:latin typeface="+mj-lt"/>
               <a:sym typeface="Wingdings" panose="05000000000000000000" pitchFamily="2" charset="2"/>
             </a:endParaRPr>
           </a:p>
           <a:p>
+            <a:pPr marL="342900" indent="-342900">
+              <a:buFont typeface="+mj-lt"/>
+              <a:buAutoNum type="arabicPeriod"/>
+            </a:pPr>
+            <a:r>
+              <a:rPr lang="en-GB" b="1" noProof="0" dirty="0">
+                <a:latin typeface="+mj-lt"/>
+                <a:sym typeface="Wingdings" panose="05000000000000000000" pitchFamily="2" charset="2"/>
+              </a:rPr>
+              <a:t>Iterative method:</a:t>
+            </a:r>
+          </a:p>
+          <a:p>
+            <a:pPr marL="800100" lvl="1" indent="-342900">
+              <a:buFont typeface="Arial" panose="020B0604020202020204" pitchFamily="34" charset="0"/>
+              <a:buChar char="•"/>
+            </a:pPr>
             <a:r>
               <a:rPr lang="en-GB" b="1" noProof="0" dirty="0" err="1">
                 <a:latin typeface="+mj-lt"/>
                 <a:sym typeface="Wingdings" panose="05000000000000000000" pitchFamily="2" charset="2"/>
               </a:rPr>
-              <a:t>Iteratieve</a:t>
+              <a:t>iDose</a:t>
             </a:r>
             <a:r>
               <a:rPr lang="en-GB" b="1" noProof="0" dirty="0">
                 <a:latin typeface="+mj-lt"/>
                 <a:sym typeface="Wingdings" panose="05000000000000000000" pitchFamily="2" charset="2"/>
               </a:rPr>
-              <a:t> method:</a:t>
+              <a:t> &amp; IMR</a:t>
             </a:r>
           </a:p>
           <a:p>
@@ -4945,7 +4991,7 @@
                                         <p:tgtEl>
                                           <p:spTgt spid="4">
                                             <p:txEl>
-                                              <p:pRg st="12" end="12"/>
+                                              <p:pRg st="13" end="13"/>
                                             </p:txEl>
                                           </p:spTgt>
                                         </p:tgtEl>
@@ -5037,7 +5083,7 @@
           <a:p>
             <a:fld id="{7921EB27-6C1B-D840-956D-529C87AC8247}" type="datetime1">
               <a:rPr lang="en-GB" noProof="0" smtClean="0"/>
-              <a:t>14-5-2025</a:t>
+              <a:t>16/05/2025</a:t>
             </a:fld>
             <a:endParaRPr lang="en-GB" noProof="0" dirty="0"/>
           </a:p>
@@ -5239,7 +5285,7 @@
           <a:p>
             <a:fld id="{7921EB27-6C1B-D840-956D-529C87AC8247}" type="datetime1">
               <a:rPr lang="en-GB" noProof="0" smtClean="0"/>
-              <a:t>14/05/2025</a:t>
+              <a:t>16/05/2025</a:t>
             </a:fld>
             <a:endParaRPr lang="en-GB" noProof="0" dirty="0"/>
           </a:p>
@@ -5491,7 +5537,7 @@
           <a:p>
             <a:fld id="{7921EB27-6C1B-D840-956D-529C87AC8247}" type="datetime1">
               <a:rPr lang="en-GB" noProof="0" smtClean="0"/>
-              <a:t>14/05/2025</a:t>
+              <a:t>16/05/2025</a:t>
             </a:fld>
             <a:endParaRPr lang="en-GB" noProof="0" dirty="0"/>
           </a:p>
@@ -5715,7 +5761,7 @@
           <a:p>
             <a:fld id="{7921EB27-6C1B-D840-956D-529C87AC8247}" type="datetime1">
               <a:rPr lang="en-GB" noProof="0" smtClean="0"/>
-              <a:t>14/05/2025</a:t>
+              <a:t>16/05/2025</a:t>
             </a:fld>
             <a:endParaRPr lang="en-GB" noProof="0" dirty="0"/>
           </a:p>
@@ -5866,13 +5912,8 @@
             </a:r>
             <a:r>
               <a:rPr lang="en-GB" dirty="0"/>
-              <a:t> make it </a:t>
-            </a:r>
-            <a:r>
-              <a:rPr lang="en-GB"/>
-              <a:t>much better</a:t>
-            </a:r>
-            <a:endParaRPr lang="en-GB" dirty="0"/>
+              <a:t> make it much better</a:t>
+            </a:r>
           </a:p>
         </p:txBody>
       </p:sp>
@@ -5890,136 +5931,6 @@
 </file>
 
 <file path=ppt/slides/slide8.xml><?xml version="1.0" encoding="utf-8"?>
-<p:sld xmlns:a="http://schemas.openxmlformats.org/drawingml/2006/main" xmlns:r="http://schemas.openxmlformats.org/officeDocument/2006/relationships" xmlns:p="http://schemas.openxmlformats.org/presentationml/2006/main">
-  <p:cSld>
-    <p:spTree>
-      <p:nvGrpSpPr>
-        <p:cNvPr id="1" name=""/>
-        <p:cNvGrpSpPr/>
-        <p:nvPr/>
-      </p:nvGrpSpPr>
-      <p:grpSpPr>
-        <a:xfrm>
-          <a:off x="0" y="0"/>
-          <a:ext cx="0" cy="0"/>
-          <a:chOff x="0" y="0"/>
-          <a:chExt cx="0" cy="0"/>
-        </a:xfrm>
-      </p:grpSpPr>
-      <p:sp>
-        <p:nvSpPr>
-          <p:cNvPr id="2" name="Text Placeholder 1">
-            <a:extLst>
-              <a:ext uri="{FF2B5EF4-FFF2-40B4-BE49-F238E27FC236}">
-                <a16:creationId xmlns:a16="http://schemas.microsoft.com/office/drawing/2014/main" id="{CC3401D1-FFD3-31CA-EF54-76EF63E5C5C5}"/>
-              </a:ext>
-            </a:extLst>
-          </p:cNvPr>
-          <p:cNvSpPr>
-            <a:spLocks noGrp="1"/>
-          </p:cNvSpPr>
-          <p:nvPr>
-            <p:ph type="body" sz="quarter" idx="15"/>
-          </p:nvPr>
-        </p:nvSpPr>
-        <p:spPr/>
-        <p:txBody>
-          <a:bodyPr/>
-          <a:lstStyle/>
-          <a:p>
-            <a:endParaRPr lang="en-GB"/>
-          </a:p>
-        </p:txBody>
-      </p:sp>
-      <p:sp>
-        <p:nvSpPr>
-          <p:cNvPr id="3" name="Text Placeholder 2">
-            <a:extLst>
-              <a:ext uri="{FF2B5EF4-FFF2-40B4-BE49-F238E27FC236}">
-                <a16:creationId xmlns:a16="http://schemas.microsoft.com/office/drawing/2014/main" id="{FA0A5071-34F5-D671-7E94-C98F6C8517D6}"/>
-              </a:ext>
-            </a:extLst>
-          </p:cNvPr>
-          <p:cNvSpPr>
-            <a:spLocks noGrp="1"/>
-          </p:cNvSpPr>
-          <p:nvPr>
-            <p:ph type="body" sz="quarter" idx="16"/>
-          </p:nvPr>
-        </p:nvSpPr>
-        <p:spPr/>
-        <p:txBody>
-          <a:bodyPr/>
-          <a:lstStyle/>
-          <a:p>
-            <a:endParaRPr lang="en-GB"/>
-          </a:p>
-        </p:txBody>
-      </p:sp>
-      <p:sp>
-        <p:nvSpPr>
-          <p:cNvPr id="4" name="Title 3">
-            <a:extLst>
-              <a:ext uri="{FF2B5EF4-FFF2-40B4-BE49-F238E27FC236}">
-                <a16:creationId xmlns:a16="http://schemas.microsoft.com/office/drawing/2014/main" id="{449A5D36-D63E-DBAE-0A23-7A785A2D47B2}"/>
-              </a:ext>
-            </a:extLst>
-          </p:cNvPr>
-          <p:cNvSpPr>
-            <a:spLocks noGrp="1"/>
-          </p:cNvSpPr>
-          <p:nvPr>
-            <p:ph type="ctrTitle"/>
-          </p:nvPr>
-        </p:nvSpPr>
-        <p:spPr/>
-        <p:txBody>
-          <a:bodyPr/>
-          <a:lstStyle/>
-          <a:p>
-            <a:endParaRPr lang="en-GB"/>
-          </a:p>
-        </p:txBody>
-      </p:sp>
-      <p:sp>
-        <p:nvSpPr>
-          <p:cNvPr id="5" name="Text Placeholder 4">
-            <a:extLst>
-              <a:ext uri="{FF2B5EF4-FFF2-40B4-BE49-F238E27FC236}">
-                <a16:creationId xmlns:a16="http://schemas.microsoft.com/office/drawing/2014/main" id="{752EAE4D-64EC-EEF1-D708-60517ACB1562}"/>
-              </a:ext>
-            </a:extLst>
-          </p:cNvPr>
-          <p:cNvSpPr>
-            <a:spLocks noGrp="1"/>
-          </p:cNvSpPr>
-          <p:nvPr>
-            <p:ph type="body" sz="quarter" idx="14"/>
-          </p:nvPr>
-        </p:nvSpPr>
-        <p:spPr/>
-        <p:txBody>
-          <a:bodyPr/>
-          <a:lstStyle/>
-          <a:p>
-            <a:endParaRPr lang="en-GB"/>
-          </a:p>
-        </p:txBody>
-      </p:sp>
-    </p:spTree>
-    <p:extLst>
-      <p:ext uri="{BB962C8B-B14F-4D97-AF65-F5344CB8AC3E}">
-        <p14:creationId xmlns:p14="http://schemas.microsoft.com/office/powerpoint/2010/main" val="4200184797"/>
-      </p:ext>
-    </p:extLst>
-  </p:cSld>
-  <p:clrMapOvr>
-    <a:masterClrMapping/>
-  </p:clrMapOvr>
-</p:sld>
-</file>
-
-<file path=ppt/slides/slide9.xml><?xml version="1.0" encoding="utf-8"?>
 <p:sld xmlns:a="http://schemas.openxmlformats.org/drawingml/2006/main" xmlns:r="http://schemas.openxmlformats.org/officeDocument/2006/relationships" xmlns:p="http://schemas.openxmlformats.org/presentationml/2006/main">
   <p:cSld>
     <p:spTree>
@@ -6065,7 +5976,7 @@
           <a:p>
             <a:fld id="{7921EB27-6C1B-D840-956D-529C87AC8247}" type="datetime1">
               <a:rPr lang="en-GB" noProof="0" smtClean="0"/>
-              <a:t>14/05/2025</a:t>
+              <a:t>16/05/2025</a:t>
             </a:fld>
             <a:endParaRPr lang="en-GB" noProof="0" dirty="0"/>
           </a:p>
@@ -6147,7 +6058,7 @@
         <p:spPr>
           <a:xfrm>
             <a:off x="393189" y="2222986"/>
-            <a:ext cx="11196267" cy="646331"/>
+            <a:ext cx="11196267" cy="1754326"/>
           </a:xfrm>
           <a:prstGeom prst="rect">
             <a:avLst/>
@@ -6168,19 +6079,7 @@
               <a:rPr lang="en-GB" noProof="0" dirty="0">
                 <a:latin typeface="+mj-lt"/>
               </a:rPr>
-              <a:t>In IMR the A has </a:t>
-            </a:r>
-            <a:r>
-              <a:rPr lang="en-GB" noProof="0" dirty="0" err="1">
-                <a:latin typeface="+mj-lt"/>
-              </a:rPr>
-              <a:t>physcial</a:t>
-            </a:r>
-            <a:r>
-              <a:rPr lang="en-GB" noProof="0" dirty="0">
-                <a:latin typeface="+mj-lt"/>
-              </a:rPr>
-              <a:t> prior information it is now hard to implement this in our model.</a:t>
+              <a:t>In IMR the A has physical prior information it is now hard to implement this in our model.</a:t>
             </a:r>
           </a:p>
           <a:p>
@@ -6206,6 +6105,48 @@
               </a:rPr>
               <a:t> noise right?</a:t>
             </a:r>
+          </a:p>
+          <a:p>
+            <a:pPr marL="342900" indent="-342900">
+              <a:buFont typeface="+mj-lt"/>
+              <a:buAutoNum type="arabicPeriod"/>
+            </a:pPr>
+            <a:endParaRPr lang="en-GB" dirty="0">
+              <a:latin typeface="+mj-lt"/>
+            </a:endParaRPr>
+          </a:p>
+          <a:p>
+            <a:pPr marL="342900" indent="-342900">
+              <a:buFont typeface="+mj-lt"/>
+              <a:buAutoNum type="arabicPeriod"/>
+            </a:pPr>
+            <a:r>
+              <a:rPr lang="en-GB" dirty="0">
+                <a:latin typeface="+mj-lt"/>
+              </a:rPr>
+              <a:t>There is also a W? what is this thing?</a:t>
+            </a:r>
+          </a:p>
+          <a:p>
+            <a:pPr marL="342900" indent="-342900">
+              <a:buFont typeface="+mj-lt"/>
+              <a:buAutoNum type="arabicPeriod"/>
+            </a:pPr>
+            <a:r>
+              <a:rPr lang="en-GB" dirty="0">
+                <a:latin typeface="+mj-lt"/>
+              </a:rPr>
+              <a:t>Possible metrics for comparison.</a:t>
+            </a:r>
+          </a:p>
+          <a:p>
+            <a:pPr marL="342900" indent="-342900">
+              <a:buFont typeface="+mj-lt"/>
+              <a:buAutoNum type="arabicPeriod"/>
+            </a:pPr>
+            <a:endParaRPr lang="en-GB" dirty="0">
+              <a:latin typeface="+mj-lt"/>
+            </a:endParaRPr>
           </a:p>
         </p:txBody>
       </p:sp>

</xml_diff>